<commit_message>
update ppt and images
</commit_message>
<xml_diff>
--- a/Project_Space_Debris/Ordner_Yu/Folien/final/20230203_Final.pptx
+++ b/Project_Space_Debris/Ordner_Yu/Folien/final/20230203_Final.pptx
@@ -7425,32 +7425,11 @@
           <a:bodyPr/>
           <a:lstStyle/>
           <a:p>
-            <a:endParaRPr lang="zh-CN" altLang="en-US"/>
-          </a:p>
-        </p:txBody>
-      </p:sp>
-      <p:sp>
-        <p:nvSpPr>
-          <p:cNvPr id="3" name="内容占位符 2">
-            <a:extLst>
-              <a:ext uri="{FF2B5EF4-FFF2-40B4-BE49-F238E27FC236}">
-                <a16:creationId xmlns:a16="http://schemas.microsoft.com/office/drawing/2014/main" id="{C7FDCCFC-4F92-16F8-CD32-448656D98C8E}"/>
-              </a:ext>
-            </a:extLst>
-          </p:cNvPr>
-          <p:cNvSpPr>
-            <a:spLocks noGrp="1"/>
-          </p:cNvSpPr>
-          <p:nvPr>
-            <p:ph idx="1"/>
-          </p:nvPr>
-        </p:nvSpPr>
-        <p:spPr/>
-        <p:txBody>
-          <a:bodyPr/>
-          <a:lstStyle/>
-          <a:p>
-            <a:endParaRPr lang="zh-CN" altLang="en-US"/>
+            <a:r>
+              <a:rPr lang="en-US" altLang="zh-CN" dirty="0"/>
+              <a:t>Area to mass ratio distribution</a:t>
+            </a:r>
+            <a:endParaRPr lang="zh-CN" altLang="en-US" dirty="0"/>
           </a:p>
         </p:txBody>
       </p:sp>
@@ -7486,6 +7465,83 @@
               <a:t>10</a:t>
             </a:fld>
             <a:endParaRPr lang="de-DE" altLang="en-US"/>
+          </a:p>
+        </p:txBody>
+      </p:sp>
+      <p:pic>
+        <p:nvPicPr>
+          <p:cNvPr id="9" name="内容占位符 8" descr="图表, 条形图&#10;&#10;描述已自动生成">
+            <a:extLst>
+              <a:ext uri="{FF2B5EF4-FFF2-40B4-BE49-F238E27FC236}">
+                <a16:creationId xmlns:a16="http://schemas.microsoft.com/office/drawing/2014/main" id="{B88D6A25-E312-FAEB-430D-4FB23A90061F}"/>
+              </a:ext>
+            </a:extLst>
+          </p:cNvPr>
+          <p:cNvPicPr>
+            <a:picLocks noGrp="1" noChangeAspect="1"/>
+          </p:cNvPicPr>
+          <p:nvPr>
+            <p:ph idx="1"/>
+          </p:nvPr>
+        </p:nvPicPr>
+        <p:blipFill>
+          <a:blip r:embed="rId2">
+            <a:extLst>
+              <a:ext uri="{28A0092B-C50C-407E-A947-70E740481C1C}">
+                <a14:useLocalDpi xmlns:a14="http://schemas.microsoft.com/office/drawing/2010/main" val="0"/>
+              </a:ext>
+            </a:extLst>
+          </a:blip>
+          <a:stretch>
+            <a:fillRect/>
+          </a:stretch>
+        </p:blipFill>
+        <p:spPr>
+          <a:xfrm>
+            <a:off x="539552" y="1124744"/>
+            <a:ext cx="9111380" cy="4446542"/>
+          </a:xfrm>
+        </p:spPr>
+      </p:pic>
+      <p:sp>
+        <p:nvSpPr>
+          <p:cNvPr id="10" name="文本框 9">
+            <a:extLst>
+              <a:ext uri="{FF2B5EF4-FFF2-40B4-BE49-F238E27FC236}">
+                <a16:creationId xmlns:a16="http://schemas.microsoft.com/office/drawing/2014/main" id="{DD584155-8CD3-28B2-D5D6-C0A3C8490F48}"/>
+              </a:ext>
+            </a:extLst>
+          </p:cNvPr>
+          <p:cNvSpPr txBox="1"/>
+          <p:nvPr/>
+        </p:nvSpPr>
+        <p:spPr>
+          <a:xfrm>
+            <a:off x="674476" y="5871929"/>
+            <a:ext cx="6017994" cy="707886"/>
+          </a:xfrm>
+          <a:prstGeom prst="rect">
+            <a:avLst/>
+          </a:prstGeom>
+          <a:noFill/>
+        </p:spPr>
+        <p:txBody>
+          <a:bodyPr wrap="none" rtlCol="0">
+            <a:spAutoFit/>
+          </a:bodyPr>
+          <a:lstStyle/>
+          <a:p>
+            <a:r>
+              <a:rPr lang="en-US" altLang="zh-CN" sz="2000" dirty="0"/>
+              <a:t>Though there are more than 20 000 objects in 2022, </a:t>
+            </a:r>
+          </a:p>
+          <a:p>
+            <a:r>
+              <a:rPr lang="en-US" altLang="zh-CN" sz="2000" dirty="0"/>
+              <a:t>only 12472 of them are know with section area and mass</a:t>
+            </a:r>
+            <a:endParaRPr lang="zh-CN" altLang="en-US" sz="2000" dirty="0"/>
           </a:p>
         </p:txBody>
       </p:sp>
@@ -7540,35 +7596,417 @@
           <a:bodyPr/>
           <a:lstStyle/>
           <a:p>
-            <a:endParaRPr lang="zh-CN" altLang="en-US"/>
-          </a:p>
-        </p:txBody>
-      </p:sp>
-      <p:sp>
-        <p:nvSpPr>
-          <p:cNvPr id="3" name="内容占位符 2">
-            <a:extLst>
-              <a:ext uri="{FF2B5EF4-FFF2-40B4-BE49-F238E27FC236}">
-                <a16:creationId xmlns:a16="http://schemas.microsoft.com/office/drawing/2014/main" id="{C7FDCCFC-4F92-16F8-CD32-448656D98C8E}"/>
-              </a:ext>
-            </a:extLst>
-          </p:cNvPr>
-          <p:cNvSpPr>
-            <a:spLocks noGrp="1"/>
-          </p:cNvSpPr>
-          <p:nvPr>
-            <p:ph idx="1"/>
-          </p:nvPr>
-        </p:nvSpPr>
-        <p:spPr/>
-        <p:txBody>
-          <a:bodyPr/>
-          <a:lstStyle/>
-          <a:p>
-            <a:endParaRPr lang="zh-CN" altLang="en-US"/>
-          </a:p>
-        </p:txBody>
-      </p:sp>
+            <a:r>
+              <a:rPr lang="en-US" altLang="zh-CN" dirty="0"/>
+              <a:t>Integration and simplification </a:t>
+            </a:r>
+            <a:endParaRPr lang="zh-CN" altLang="en-US" dirty="0"/>
+          </a:p>
+        </p:txBody>
+      </p:sp>
+      <mc:AlternateContent xmlns:mc="http://schemas.openxmlformats.org/markup-compatibility/2006">
+        <mc:Choice xmlns:a14="http://schemas.microsoft.com/office/drawing/2010/main" Requires="a14">
+          <p:sp>
+            <p:nvSpPr>
+              <p:cNvPr id="3" name="内容占位符 2">
+                <a:extLst>
+                  <a:ext uri="{FF2B5EF4-FFF2-40B4-BE49-F238E27FC236}">
+                    <a16:creationId xmlns:a16="http://schemas.microsoft.com/office/drawing/2014/main" id="{C7FDCCFC-4F92-16F8-CD32-448656D98C8E}"/>
+                  </a:ext>
+                </a:extLst>
+              </p:cNvPr>
+              <p:cNvSpPr>
+                <a:spLocks noGrp="1"/>
+              </p:cNvSpPr>
+              <p:nvPr>
+                <p:ph idx="1"/>
+              </p:nvPr>
+            </p:nvSpPr>
+            <p:spPr>
+              <a:xfrm>
+                <a:off x="664096" y="2209800"/>
+                <a:ext cx="7772400" cy="4648200"/>
+              </a:xfrm>
+            </p:spPr>
+            <p:txBody>
+              <a:bodyPr/>
+              <a:lstStyle/>
+              <a:p>
+                <a:pPr marL="0" indent="0">
+                  <a:buNone/>
+                </a:pPr>
+                <a:r>
+                  <a:rPr lang="en-US" altLang="zh-CN" dirty="0">
+                    <a:latin typeface="Cambria Math" panose="02040503050406030204" pitchFamily="18" charset="0"/>
+                  </a:rPr>
+                  <a:t>Using ode113 in </a:t>
+                </a:r>
+                <a:r>
+                  <a:rPr lang="en-US" altLang="zh-CN" dirty="0" err="1">
+                    <a:latin typeface="Cambria Math" panose="02040503050406030204" pitchFamily="18" charset="0"/>
+                  </a:rPr>
+                  <a:t>matlab</a:t>
+                </a:r>
+                <a:r>
+                  <a:rPr lang="en-US" altLang="zh-CN" dirty="0">
+                    <a:latin typeface="Cambria Math" panose="02040503050406030204" pitchFamily="18" charset="0"/>
+                  </a:rPr>
+                  <a:t> to do the integration</a:t>
+                </a:r>
+              </a:p>
+              <a:p>
+                <a:pPr marL="0" indent="0">
+                  <a:buNone/>
+                </a:pPr>
+                <a:endParaRPr lang="en-US" altLang="zh-CN" dirty="0">
+                  <a:latin typeface="Cambria Math" panose="02040503050406030204" pitchFamily="18" charset="0"/>
+                </a:endParaRPr>
+              </a:p>
+              <a:p>
+                <a:pPr marL="0" indent="0">
+                  <a:buNone/>
+                </a:pPr>
+                <a:r>
+                  <a:rPr lang="en-US" altLang="zh-CN" dirty="0">
+                    <a:latin typeface="Cambria Math" panose="02040503050406030204" pitchFamily="18" charset="0"/>
+                  </a:rPr>
+                  <a:t>Following simplifications are implemented:</a:t>
+                </a:r>
+              </a:p>
+              <a:p>
+                <a14:m>
+                  <m:oMath xmlns:m="http://schemas.openxmlformats.org/officeDocument/2006/math">
+                    <m:sSub>
+                      <m:sSubPr>
+                        <m:ctrlPr>
+                          <a:rPr lang="en-US" altLang="zh-CN" sz="2400" b="1" i="1" smtClean="0">
+                            <a:latin typeface="Cambria Math" panose="02040503050406030204" pitchFamily="18" charset="0"/>
+                          </a:rPr>
+                        </m:ctrlPr>
+                      </m:sSubPr>
+                      <m:e>
+                        <m:acc>
+                          <m:accPr>
+                            <m:chr m:val="̇"/>
+                            <m:ctrlPr>
+                              <a:rPr lang="en-US" altLang="zh-CN" sz="2400" b="1" i="1" smtClean="0">
+                                <a:latin typeface="Cambria Math" panose="02040503050406030204" pitchFamily="18" charset="0"/>
+                              </a:rPr>
+                            </m:ctrlPr>
+                          </m:accPr>
+                          <m:e>
+                            <m:r>
+                              <a:rPr lang="en-US" altLang="zh-CN" sz="2400" b="1" i="1" smtClean="0">
+                                <a:latin typeface="Cambria Math" panose="02040503050406030204" pitchFamily="18" charset="0"/>
+                              </a:rPr>
+                              <m:t>𝒓</m:t>
+                            </m:r>
+                          </m:e>
+                        </m:acc>
+                      </m:e>
+                      <m:sub>
+                        <m:r>
+                          <a:rPr lang="en-US" altLang="zh-CN" sz="2400" b="1" i="1" smtClean="0">
+                            <a:latin typeface="Cambria Math" panose="02040503050406030204" pitchFamily="18" charset="0"/>
+                          </a:rPr>
+                          <m:t>𝒂</m:t>
+                        </m:r>
+                      </m:sub>
+                    </m:sSub>
+                    <m:r>
+                      <a:rPr lang="en-US" altLang="zh-CN" sz="2400" b="0" i="0" smtClean="0">
+                        <a:latin typeface="Cambria Math" panose="02040503050406030204" pitchFamily="18" charset="0"/>
+                      </a:rPr>
+                      <m:t>=0</m:t>
+                    </m:r>
+                  </m:oMath>
+                </a14:m>
+                <a:endParaRPr lang="en-US" altLang="zh-CN" dirty="0"/>
+              </a:p>
+              <a:p>
+                <a14:m>
+                  <m:oMath xmlns:m="http://schemas.openxmlformats.org/officeDocument/2006/math">
+                    <m:sSub>
+                      <m:sSubPr>
+                        <m:ctrlPr>
+                          <a:rPr lang="en-US" altLang="zh-CN" sz="2400" b="0" i="1" smtClean="0">
+                            <a:latin typeface="Cambria Math" panose="02040503050406030204" pitchFamily="18" charset="0"/>
+                          </a:rPr>
+                        </m:ctrlPr>
+                      </m:sSubPr>
+                      <m:e>
+                        <m:r>
+                          <a:rPr lang="en-US" altLang="zh-CN" sz="2400" b="0" i="1" smtClean="0">
+                            <a:latin typeface="Cambria Math" panose="02040503050406030204" pitchFamily="18" charset="0"/>
+                          </a:rPr>
+                          <m:t>𝐶</m:t>
+                        </m:r>
+                      </m:e>
+                      <m:sub>
+                        <m:r>
+                          <a:rPr lang="en-US" altLang="zh-CN" sz="2400" b="0" i="1" smtClean="0">
+                            <a:latin typeface="Cambria Math" panose="02040503050406030204" pitchFamily="18" charset="0"/>
+                          </a:rPr>
+                          <m:t>𝑑</m:t>
+                        </m:r>
+                      </m:sub>
+                    </m:sSub>
+                    <m:r>
+                      <a:rPr lang="en-US" altLang="zh-CN" sz="2400" b="0" i="1" smtClean="0">
+                        <a:latin typeface="Cambria Math" panose="02040503050406030204" pitchFamily="18" charset="0"/>
+                      </a:rPr>
+                      <m:t>=2.5</m:t>
+                    </m:r>
+                  </m:oMath>
+                </a14:m>
+                <a:endParaRPr lang="en-US" altLang="zh-CN" dirty="0"/>
+              </a:p>
+              <a:p>
+                <a:r>
+                  <a:rPr lang="en-US" altLang="zh-CN" dirty="0"/>
+                  <a:t>Using Harris-Priester model</a:t>
+                </a:r>
+              </a:p>
+              <a:p>
+                <a14:m>
+                  <m:oMath xmlns:m="http://schemas.openxmlformats.org/officeDocument/2006/math">
+                    <m:r>
+                      <a:rPr lang="en-US" altLang="zh-CN" b="0" i="1" smtClean="0">
+                        <a:latin typeface="Cambria Math" panose="02040503050406030204" pitchFamily="18" charset="0"/>
+                      </a:rPr>
+                      <m:t>h</m:t>
+                    </m:r>
+                    <m:r>
+                      <a:rPr lang="en-US" altLang="zh-CN" i="1" smtClean="0">
+                        <a:latin typeface="Cambria Math" panose="02040503050406030204" pitchFamily="18" charset="0"/>
+                      </a:rPr>
+                      <m:t>=</m:t>
+                    </m:r>
+                    <m:r>
+                      <a:rPr lang="en-US" altLang="zh-CN" b="0" i="1" smtClean="0">
+                        <a:latin typeface="Cambria Math" panose="02040503050406030204" pitchFamily="18" charset="0"/>
+                      </a:rPr>
+                      <m:t>𝑛𝑜𝑟𝑚</m:t>
+                    </m:r>
+                    <m:d>
+                      <m:dPr>
+                        <m:ctrlPr>
+                          <a:rPr lang="en-US" altLang="zh-CN" b="0" i="1" smtClean="0">
+                            <a:latin typeface="Cambria Math" panose="02040503050406030204" pitchFamily="18" charset="0"/>
+                          </a:rPr>
+                        </m:ctrlPr>
+                      </m:dPr>
+                      <m:e>
+                        <m:sSub>
+                          <m:sSubPr>
+                            <m:ctrlPr>
+                              <a:rPr lang="en-US" altLang="zh-CN" b="1" i="1" smtClean="0">
+                                <a:latin typeface="Cambria Math" panose="02040503050406030204" pitchFamily="18" charset="0"/>
+                              </a:rPr>
+                            </m:ctrlPr>
+                          </m:sSubPr>
+                          <m:e>
+                            <m:r>
+                              <a:rPr lang="en-US" altLang="zh-CN" b="1" i="1" smtClean="0">
+                                <a:latin typeface="Cambria Math" panose="02040503050406030204" pitchFamily="18" charset="0"/>
+                              </a:rPr>
+                              <m:t>𝒓</m:t>
+                            </m:r>
+                          </m:e>
+                          <m:sub>
+                            <m:r>
+                              <a:rPr lang="en-US" altLang="zh-CN" b="1" i="1" smtClean="0">
+                                <a:latin typeface="Cambria Math" panose="02040503050406030204" pitchFamily="18" charset="0"/>
+                              </a:rPr>
+                              <m:t>𝒊</m:t>
+                            </m:r>
+                          </m:sub>
+                        </m:sSub>
+                      </m:e>
+                    </m:d>
+                    <m:r>
+                      <a:rPr lang="en-US" altLang="zh-CN" b="0" i="1" smtClean="0">
+                        <a:latin typeface="Cambria Math" panose="02040503050406030204" pitchFamily="18" charset="0"/>
+                      </a:rPr>
+                      <m:t>−</m:t>
+                    </m:r>
+                    <m:r>
+                      <a:rPr lang="en-US" altLang="zh-CN" b="0" i="1" smtClean="0">
+                        <a:latin typeface="Cambria Math" panose="02040503050406030204" pitchFamily="18" charset="0"/>
+                      </a:rPr>
+                      <m:t>𝑅</m:t>
+                    </m:r>
+                  </m:oMath>
+                </a14:m>
+                <a:r>
+                  <a:rPr lang="zh-CN" altLang="en-US" dirty="0"/>
+                  <a:t> </a:t>
+                </a:r>
+                <a:r>
+                  <a:rPr lang="en-US" altLang="zh-CN" dirty="0"/>
+                  <a:t> instead of  </a:t>
+                </a:r>
+                <a14:m>
+                  <m:oMath xmlns:m="http://schemas.openxmlformats.org/officeDocument/2006/math">
+                    <m:sSub>
+                      <m:sSubPr>
+                        <m:ctrlPr>
+                          <a:rPr lang="en-US" altLang="zh-CN" b="1" i="1">
+                            <a:latin typeface="Cambria Math" panose="02040503050406030204" pitchFamily="18" charset="0"/>
+                          </a:rPr>
+                        </m:ctrlPr>
+                      </m:sSubPr>
+                      <m:e>
+                        <m:r>
+                          <a:rPr lang="en-US" altLang="zh-CN" b="1" i="1">
+                            <a:latin typeface="Cambria Math" panose="02040503050406030204" pitchFamily="18" charset="0"/>
+                          </a:rPr>
+                          <m:t>𝒓</m:t>
+                        </m:r>
+                      </m:e>
+                      <m:sub>
+                        <m:r>
+                          <a:rPr lang="en-US" altLang="zh-CN" b="1" i="1">
+                            <a:latin typeface="Cambria Math" panose="02040503050406030204" pitchFamily="18" charset="0"/>
+                          </a:rPr>
+                          <m:t>𝒊</m:t>
+                        </m:r>
+                      </m:sub>
+                    </m:sSub>
+                    <m:r>
+                      <a:rPr lang="en-US" altLang="zh-CN" b="1" i="1" smtClean="0">
+                        <a:latin typeface="Cambria Math" panose="02040503050406030204" pitchFamily="18" charset="0"/>
+                      </a:rPr>
+                      <m:t>→</m:t>
+                    </m:r>
+                    <m:sSub>
+                      <m:sSubPr>
+                        <m:ctrlPr>
+                          <a:rPr lang="en-US" altLang="zh-CN" b="1" i="1" smtClean="0">
+                            <a:latin typeface="Cambria Math" panose="02040503050406030204" pitchFamily="18" charset="0"/>
+                          </a:rPr>
+                        </m:ctrlPr>
+                      </m:sSubPr>
+                      <m:e>
+                        <m:r>
+                          <a:rPr lang="en-US" altLang="zh-CN" b="1" i="1" smtClean="0">
+                            <a:latin typeface="Cambria Math" panose="02040503050406030204" pitchFamily="18" charset="0"/>
+                          </a:rPr>
+                          <m:t>𝒓</m:t>
+                        </m:r>
+                      </m:e>
+                      <m:sub>
+                        <m:r>
+                          <a:rPr lang="en-US" altLang="zh-CN" b="1" i="1" smtClean="0">
+                            <a:latin typeface="Cambria Math" panose="02040503050406030204" pitchFamily="18" charset="0"/>
+                          </a:rPr>
+                          <m:t>𝒆</m:t>
+                        </m:r>
+                      </m:sub>
+                    </m:sSub>
+                    <m:r>
+                      <a:rPr lang="en-US" altLang="zh-CN" b="1" i="1" smtClean="0">
+                        <a:latin typeface="Cambria Math" panose="02040503050406030204" pitchFamily="18" charset="0"/>
+                      </a:rPr>
+                      <m:t>→(</m:t>
+                    </m:r>
+                    <m:r>
+                      <a:rPr lang="en-US" altLang="zh-CN" b="0" i="1" smtClean="0">
+                        <a:latin typeface="Cambria Math" panose="02040503050406030204" pitchFamily="18" charset="0"/>
+                      </a:rPr>
+                      <m:t>𝑙𝑎𝑡</m:t>
+                    </m:r>
+                    <m:r>
+                      <a:rPr lang="en-US" altLang="zh-CN" b="0" i="1" smtClean="0">
+                        <a:latin typeface="Cambria Math" panose="02040503050406030204" pitchFamily="18" charset="0"/>
+                      </a:rPr>
+                      <m:t>,</m:t>
+                    </m:r>
+                    <m:r>
+                      <a:rPr lang="en-US" altLang="zh-CN" b="0" i="1" smtClean="0">
+                        <a:latin typeface="Cambria Math" panose="02040503050406030204" pitchFamily="18" charset="0"/>
+                      </a:rPr>
+                      <m:t>𝑙𝑜𝑛</m:t>
+                    </m:r>
+                    <m:r>
+                      <a:rPr lang="en-US" altLang="zh-CN" b="0" i="1" smtClean="0">
+                        <a:latin typeface="Cambria Math" panose="02040503050406030204" pitchFamily="18" charset="0"/>
+                      </a:rPr>
+                      <m:t>,</m:t>
+                    </m:r>
+                    <m:r>
+                      <a:rPr lang="en-US" altLang="zh-CN" b="0" i="1" smtClean="0">
+                        <a:latin typeface="Cambria Math" panose="02040503050406030204" pitchFamily="18" charset="0"/>
+                      </a:rPr>
+                      <m:t>h</m:t>
+                    </m:r>
+                    <m:r>
+                      <a:rPr lang="en-US" altLang="zh-CN" b="1" i="1" smtClean="0">
+                        <a:latin typeface="Cambria Math" panose="02040503050406030204" pitchFamily="18" charset="0"/>
+                      </a:rPr>
+                      <m:t>)</m:t>
+                    </m:r>
+                  </m:oMath>
+                </a14:m>
+                <a:endParaRPr lang="zh-CN" altLang="en-US" dirty="0"/>
+              </a:p>
+              <a:p>
+                <a:pPr marL="0" indent="0">
+                  <a:buNone/>
+                </a:pPr>
+                <a:r>
+                  <a:rPr lang="en-US" altLang="zh-CN" dirty="0"/>
+                  <a:t> </a:t>
+                </a:r>
+                <a:endParaRPr lang="zh-CN" altLang="en-US" dirty="0"/>
+              </a:p>
+            </p:txBody>
+          </p:sp>
+        </mc:Choice>
+        <mc:Fallback>
+          <p:sp>
+            <p:nvSpPr>
+              <p:cNvPr id="3" name="内容占位符 2">
+                <a:extLst>
+                  <a:ext uri="{FF2B5EF4-FFF2-40B4-BE49-F238E27FC236}">
+                    <a16:creationId xmlns:a16="http://schemas.microsoft.com/office/drawing/2014/main" id="{C7FDCCFC-4F92-16F8-CD32-448656D98C8E}"/>
+                  </a:ext>
+                </a:extLst>
+              </p:cNvPr>
+              <p:cNvSpPr>
+                <a:spLocks noGrp="1" noRot="1" noChangeAspect="1" noMove="1" noResize="1" noEditPoints="1" noAdjustHandles="1" noChangeArrowheads="1" noChangeShapeType="1" noTextEdit="1"/>
+              </p:cNvSpPr>
+              <p:nvPr>
+                <p:ph idx="1"/>
+              </p:nvPr>
+            </p:nvSpPr>
+            <p:spPr>
+              <a:xfrm>
+                <a:off x="664096" y="2209800"/>
+                <a:ext cx="7772400" cy="4648200"/>
+              </a:xfrm>
+              <a:blipFill>
+                <a:blip r:embed="rId2"/>
+                <a:stretch>
+                  <a:fillRect l="-1333" t="-1050"/>
+                </a:stretch>
+              </a:blipFill>
+            </p:spPr>
+            <p:txBody>
+              <a:bodyPr/>
+              <a:lstStyle/>
+              <a:p>
+                <a:r>
+                  <a:rPr lang="zh-CN" altLang="en-US">
+                    <a:noFill/>
+                  </a:rPr>
+                  <a:t> </a:t>
+                </a:r>
+              </a:p>
+            </p:txBody>
+          </p:sp>
+        </mc:Fallback>
+      </mc:AlternateContent>
       <p:sp>
         <p:nvSpPr>
           <p:cNvPr id="4" name="灯片编号占位符 3">
@@ -7604,6 +8042,42 @@
           </a:p>
         </p:txBody>
       </p:sp>
+      <p:pic>
+        <p:nvPicPr>
+          <p:cNvPr id="6" name="图片 5" descr="图片包含 图示&#10;&#10;描述已自动生成">
+            <a:extLst>
+              <a:ext uri="{FF2B5EF4-FFF2-40B4-BE49-F238E27FC236}">
+                <a16:creationId xmlns:a16="http://schemas.microsoft.com/office/drawing/2014/main" id="{085F5DF4-F825-5F40-ED87-ED566C9BEFA9}"/>
+              </a:ext>
+            </a:extLst>
+          </p:cNvPr>
+          <p:cNvPicPr>
+            <a:picLocks noChangeAspect="1"/>
+          </p:cNvPicPr>
+          <p:nvPr/>
+        </p:nvPicPr>
+        <p:blipFill>
+          <a:blip r:embed="rId3">
+            <a:extLst>
+              <a:ext uri="{28A0092B-C50C-407E-A947-70E740481C1C}">
+                <a14:useLocalDpi xmlns:a14="http://schemas.microsoft.com/office/drawing/2010/main" val="0"/>
+              </a:ext>
+            </a:extLst>
+          </a:blip>
+          <a:stretch>
+            <a:fillRect/>
+          </a:stretch>
+        </p:blipFill>
+        <p:spPr>
+          <a:xfrm>
+            <a:off x="3013575" y="1149931"/>
+            <a:ext cx="3116850" cy="891617"/>
+          </a:xfrm>
+          <a:prstGeom prst="rect">
+            <a:avLst/>
+          </a:prstGeom>
+        </p:spPr>
+      </p:pic>
     </p:spTree>
     <p:extLst>
       <p:ext uri="{BB962C8B-B14F-4D97-AF65-F5344CB8AC3E}">
@@ -7655,35 +8129,49 @@
           <a:bodyPr/>
           <a:lstStyle/>
           <a:p>
-            <a:endParaRPr lang="zh-CN" altLang="en-US"/>
-          </a:p>
-        </p:txBody>
-      </p:sp>
-      <p:sp>
-        <p:nvSpPr>
-          <p:cNvPr id="3" name="内容占位符 2">
-            <a:extLst>
-              <a:ext uri="{FF2B5EF4-FFF2-40B4-BE49-F238E27FC236}">
-                <a16:creationId xmlns:a16="http://schemas.microsoft.com/office/drawing/2014/main" id="{C7FDCCFC-4F92-16F8-CD32-448656D98C8E}"/>
-              </a:ext>
-            </a:extLst>
-          </p:cNvPr>
-          <p:cNvSpPr>
-            <a:spLocks noGrp="1"/>
-          </p:cNvSpPr>
+            <a:r>
+              <a:rPr lang="en-US" altLang="zh-CN" dirty="0"/>
+              <a:t>Integration Result for circular orbit</a:t>
+            </a:r>
+            <a:endParaRPr lang="zh-CN" altLang="en-US" dirty="0"/>
+          </a:p>
+        </p:txBody>
+      </p:sp>
+      <p:pic>
+        <p:nvPicPr>
+          <p:cNvPr id="6" name="内容占位符 5" descr="图表&#10;&#10;描述已自动生成">
+            <a:extLst>
+              <a:ext uri="{FF2B5EF4-FFF2-40B4-BE49-F238E27FC236}">
+                <a16:creationId xmlns:a16="http://schemas.microsoft.com/office/drawing/2014/main" id="{196C19A0-D204-A36B-E50E-FD6CB25AFEF1}"/>
+              </a:ext>
+            </a:extLst>
+          </p:cNvPr>
+          <p:cNvPicPr>
+            <a:picLocks noGrp="1" noChangeAspect="1"/>
+          </p:cNvPicPr>
           <p:nvPr>
             <p:ph idx="1"/>
           </p:nvPr>
-        </p:nvSpPr>
-        <p:spPr/>
-        <p:txBody>
-          <a:bodyPr/>
-          <a:lstStyle/>
-          <a:p>
-            <a:endParaRPr lang="zh-CN" altLang="en-US"/>
-          </a:p>
-        </p:txBody>
-      </p:sp>
+        </p:nvPicPr>
+        <p:blipFill>
+          <a:blip r:embed="rId2">
+            <a:extLst>
+              <a:ext uri="{28A0092B-C50C-407E-A947-70E740481C1C}">
+                <a14:useLocalDpi xmlns:a14="http://schemas.microsoft.com/office/drawing/2010/main" val="0"/>
+              </a:ext>
+            </a:extLst>
+          </a:blip>
+          <a:stretch>
+            <a:fillRect/>
+          </a:stretch>
+        </p:blipFill>
+        <p:spPr>
+          <a:xfrm>
+            <a:off x="685800" y="1646754"/>
+            <a:ext cx="8521176" cy="4158510"/>
+          </a:xfrm>
+        </p:spPr>
+      </p:pic>
       <p:sp>
         <p:nvSpPr>
           <p:cNvPr id="4" name="灯片编号占位符 3">
@@ -7770,32 +8258,11 @@
           <a:bodyPr/>
           <a:lstStyle/>
           <a:p>
-            <a:endParaRPr lang="zh-CN" altLang="en-US"/>
-          </a:p>
-        </p:txBody>
-      </p:sp>
-      <p:sp>
-        <p:nvSpPr>
-          <p:cNvPr id="3" name="内容占位符 2">
-            <a:extLst>
-              <a:ext uri="{FF2B5EF4-FFF2-40B4-BE49-F238E27FC236}">
-                <a16:creationId xmlns:a16="http://schemas.microsoft.com/office/drawing/2014/main" id="{C7FDCCFC-4F92-16F8-CD32-448656D98C8E}"/>
-              </a:ext>
-            </a:extLst>
-          </p:cNvPr>
-          <p:cNvSpPr>
-            <a:spLocks noGrp="1"/>
-          </p:cNvSpPr>
-          <p:nvPr>
-            <p:ph idx="1"/>
-          </p:nvPr>
-        </p:nvSpPr>
-        <p:spPr/>
-        <p:txBody>
-          <a:bodyPr/>
-          <a:lstStyle/>
-          <a:p>
-            <a:endParaRPr lang="zh-CN" altLang="en-US"/>
+            <a:r>
+              <a:rPr lang="en-US" altLang="zh-CN" dirty="0"/>
+              <a:t>Integration Result for circular orbit</a:t>
+            </a:r>
+            <a:endParaRPr lang="zh-CN" altLang="en-US" dirty="0"/>
           </a:p>
         </p:txBody>
       </p:sp>
@@ -7834,6 +8301,41 @@
           </a:p>
         </p:txBody>
       </p:sp>
+      <p:pic>
+        <p:nvPicPr>
+          <p:cNvPr id="9" name="内容占位符 8" descr="图表, 折线图&#10;&#10;描述已自动生成">
+            <a:extLst>
+              <a:ext uri="{FF2B5EF4-FFF2-40B4-BE49-F238E27FC236}">
+                <a16:creationId xmlns:a16="http://schemas.microsoft.com/office/drawing/2014/main" id="{B5E8A0C2-E030-8309-BDDD-E7F8127C2DB2}"/>
+              </a:ext>
+            </a:extLst>
+          </p:cNvPr>
+          <p:cNvPicPr>
+            <a:picLocks noGrp="1" noChangeAspect="1"/>
+          </p:cNvPicPr>
+          <p:nvPr>
+            <p:ph idx="1"/>
+          </p:nvPr>
+        </p:nvPicPr>
+        <p:blipFill>
+          <a:blip r:embed="rId2">
+            <a:extLst>
+              <a:ext uri="{28A0092B-C50C-407E-A947-70E740481C1C}">
+                <a14:useLocalDpi xmlns:a14="http://schemas.microsoft.com/office/drawing/2010/main" val="0"/>
+              </a:ext>
+            </a:extLst>
+          </a:blip>
+          <a:stretch>
+            <a:fillRect/>
+          </a:stretch>
+        </p:blipFill>
+        <p:spPr>
+          <a:xfrm>
+            <a:off x="685800" y="1556792"/>
+            <a:ext cx="8694496" cy="4243094"/>
+          </a:xfrm>
+        </p:spPr>
+      </p:pic>
     </p:spTree>
     <p:extLst>
       <p:ext uri="{BB962C8B-B14F-4D97-AF65-F5344CB8AC3E}">
@@ -7885,35 +8387,49 @@
           <a:bodyPr/>
           <a:lstStyle/>
           <a:p>
-            <a:endParaRPr lang="zh-CN" altLang="en-US"/>
-          </a:p>
-        </p:txBody>
-      </p:sp>
-      <p:sp>
-        <p:nvSpPr>
-          <p:cNvPr id="3" name="内容占位符 2">
-            <a:extLst>
-              <a:ext uri="{FF2B5EF4-FFF2-40B4-BE49-F238E27FC236}">
-                <a16:creationId xmlns:a16="http://schemas.microsoft.com/office/drawing/2014/main" id="{C7FDCCFC-4F92-16F8-CD32-448656D98C8E}"/>
-              </a:ext>
-            </a:extLst>
-          </p:cNvPr>
-          <p:cNvSpPr>
-            <a:spLocks noGrp="1"/>
-          </p:cNvSpPr>
+            <a:r>
+              <a:rPr lang="en-US" altLang="zh-CN" dirty="0"/>
+              <a:t>Integration Result for ellipsoidal orbit</a:t>
+            </a:r>
+            <a:endParaRPr lang="zh-CN" altLang="en-US" dirty="0"/>
+          </a:p>
+        </p:txBody>
+      </p:sp>
+      <p:pic>
+        <p:nvPicPr>
+          <p:cNvPr id="6" name="内容占位符 5" descr="图表&#10;&#10;描述已自动生成">
+            <a:extLst>
+              <a:ext uri="{FF2B5EF4-FFF2-40B4-BE49-F238E27FC236}">
+                <a16:creationId xmlns:a16="http://schemas.microsoft.com/office/drawing/2014/main" id="{BF8BBF3F-A47A-84E2-F118-A1A61DE56BD7}"/>
+              </a:ext>
+            </a:extLst>
+          </p:cNvPr>
+          <p:cNvPicPr>
+            <a:picLocks noGrp="1" noChangeAspect="1"/>
+          </p:cNvPicPr>
           <p:nvPr>
             <p:ph idx="1"/>
           </p:nvPr>
-        </p:nvSpPr>
-        <p:spPr/>
-        <p:txBody>
-          <a:bodyPr/>
-          <a:lstStyle/>
-          <a:p>
-            <a:endParaRPr lang="zh-CN" altLang="en-US"/>
-          </a:p>
-        </p:txBody>
-      </p:sp>
+        </p:nvPicPr>
+        <p:blipFill>
+          <a:blip r:embed="rId2">
+            <a:extLst>
+              <a:ext uri="{28A0092B-C50C-407E-A947-70E740481C1C}">
+                <a14:useLocalDpi xmlns:a14="http://schemas.microsoft.com/office/drawing/2010/main" val="0"/>
+              </a:ext>
+            </a:extLst>
+          </a:blip>
+          <a:stretch>
+            <a:fillRect/>
+          </a:stretch>
+        </p:blipFill>
+        <p:spPr>
+          <a:xfrm>
+            <a:off x="685799" y="1196752"/>
+            <a:ext cx="8694496" cy="4243094"/>
+          </a:xfrm>
+        </p:spPr>
+      </p:pic>
       <p:sp>
         <p:nvSpPr>
           <p:cNvPr id="4" name="灯片编号占位符 3">
@@ -8000,32 +8516,11 @@
           <a:bodyPr/>
           <a:lstStyle/>
           <a:p>
-            <a:endParaRPr lang="zh-CN" altLang="en-US"/>
-          </a:p>
-        </p:txBody>
-      </p:sp>
-      <p:sp>
-        <p:nvSpPr>
-          <p:cNvPr id="3" name="内容占位符 2">
-            <a:extLst>
-              <a:ext uri="{FF2B5EF4-FFF2-40B4-BE49-F238E27FC236}">
-                <a16:creationId xmlns:a16="http://schemas.microsoft.com/office/drawing/2014/main" id="{C7FDCCFC-4F92-16F8-CD32-448656D98C8E}"/>
-              </a:ext>
-            </a:extLst>
-          </p:cNvPr>
-          <p:cNvSpPr>
-            <a:spLocks noGrp="1"/>
-          </p:cNvSpPr>
-          <p:nvPr>
-            <p:ph idx="1"/>
-          </p:nvPr>
-        </p:nvSpPr>
-        <p:spPr/>
-        <p:txBody>
-          <a:bodyPr/>
-          <a:lstStyle/>
-          <a:p>
-            <a:endParaRPr lang="zh-CN" altLang="en-US"/>
+            <a:r>
+              <a:rPr lang="en-US" altLang="zh-CN" dirty="0"/>
+              <a:t>Integration Result for ellipsoidal orbit</a:t>
+            </a:r>
+            <a:endParaRPr lang="zh-CN" altLang="en-US" dirty="0"/>
           </a:p>
         </p:txBody>
       </p:sp>
@@ -8064,6 +8559,41 @@
           </a:p>
         </p:txBody>
       </p:sp>
+      <p:pic>
+        <p:nvPicPr>
+          <p:cNvPr id="9" name="内容占位符 8" descr="图表, 散点图&#10;&#10;描述已自动生成">
+            <a:extLst>
+              <a:ext uri="{FF2B5EF4-FFF2-40B4-BE49-F238E27FC236}">
+                <a16:creationId xmlns:a16="http://schemas.microsoft.com/office/drawing/2014/main" id="{BB3FE38A-D0CF-FBC4-086B-3E45E3122F4A}"/>
+              </a:ext>
+            </a:extLst>
+          </p:cNvPr>
+          <p:cNvPicPr>
+            <a:picLocks noGrp="1" noChangeAspect="1"/>
+          </p:cNvPicPr>
+          <p:nvPr>
+            <p:ph idx="1"/>
+          </p:nvPr>
+        </p:nvPicPr>
+        <p:blipFill>
+          <a:blip r:embed="rId2">
+            <a:extLst>
+              <a:ext uri="{28A0092B-C50C-407E-A947-70E740481C1C}">
+                <a14:useLocalDpi xmlns:a14="http://schemas.microsoft.com/office/drawing/2010/main" val="0"/>
+              </a:ext>
+            </a:extLst>
+          </a:blip>
+          <a:stretch>
+            <a:fillRect/>
+          </a:stretch>
+        </p:blipFill>
+        <p:spPr>
+          <a:xfrm>
+            <a:off x="685799" y="1196752"/>
+            <a:ext cx="8694496" cy="4243094"/>
+          </a:xfrm>
+        </p:spPr>
+      </p:pic>
     </p:spTree>
     <p:extLst>
       <p:ext uri="{BB962C8B-B14F-4D97-AF65-F5344CB8AC3E}">
@@ -8115,32 +8645,11 @@
           <a:bodyPr/>
           <a:lstStyle/>
           <a:p>
-            <a:endParaRPr lang="zh-CN" altLang="en-US"/>
-          </a:p>
-        </p:txBody>
-      </p:sp>
-      <p:sp>
-        <p:nvSpPr>
-          <p:cNvPr id="3" name="内容占位符 2">
-            <a:extLst>
-              <a:ext uri="{FF2B5EF4-FFF2-40B4-BE49-F238E27FC236}">
-                <a16:creationId xmlns:a16="http://schemas.microsoft.com/office/drawing/2014/main" id="{C7FDCCFC-4F92-16F8-CD32-448656D98C8E}"/>
-              </a:ext>
-            </a:extLst>
-          </p:cNvPr>
-          <p:cNvSpPr>
-            <a:spLocks noGrp="1"/>
-          </p:cNvSpPr>
-          <p:nvPr>
-            <p:ph idx="1"/>
-          </p:nvPr>
-        </p:nvSpPr>
-        <p:spPr/>
-        <p:txBody>
-          <a:bodyPr/>
-          <a:lstStyle/>
-          <a:p>
-            <a:endParaRPr lang="zh-CN" altLang="en-US"/>
+            <a:r>
+              <a:rPr lang="en-US" altLang="zh-CN" dirty="0"/>
+              <a:t>Integration Result for ellipsoidal orbit</a:t>
+            </a:r>
+            <a:endParaRPr lang="zh-CN" altLang="en-US" dirty="0"/>
           </a:p>
         </p:txBody>
       </p:sp>
@@ -8179,6 +8688,41 @@
           </a:p>
         </p:txBody>
       </p:sp>
+      <p:pic>
+        <p:nvPicPr>
+          <p:cNvPr id="9" name="内容占位符 8" descr="图表, 散点图&#10;&#10;描述已自动生成">
+            <a:extLst>
+              <a:ext uri="{FF2B5EF4-FFF2-40B4-BE49-F238E27FC236}">
+                <a16:creationId xmlns:a16="http://schemas.microsoft.com/office/drawing/2014/main" id="{0B1B200C-AAA8-9B0F-7810-92DDB7809EDA}"/>
+              </a:ext>
+            </a:extLst>
+          </p:cNvPr>
+          <p:cNvPicPr>
+            <a:picLocks noGrp="1" noChangeAspect="1"/>
+          </p:cNvPicPr>
+          <p:nvPr>
+            <p:ph idx="1"/>
+          </p:nvPr>
+        </p:nvPicPr>
+        <p:blipFill>
+          <a:blip r:embed="rId2">
+            <a:extLst>
+              <a:ext uri="{28A0092B-C50C-407E-A947-70E740481C1C}">
+                <a14:useLocalDpi xmlns:a14="http://schemas.microsoft.com/office/drawing/2010/main" val="0"/>
+              </a:ext>
+            </a:extLst>
+          </a:blip>
+          <a:stretch>
+            <a:fillRect/>
+          </a:stretch>
+        </p:blipFill>
+        <p:spPr>
+          <a:xfrm>
+            <a:off x="685800" y="1188827"/>
+            <a:ext cx="8710736" cy="4251019"/>
+          </a:xfrm>
+        </p:spPr>
+      </p:pic>
     </p:spTree>
     <p:extLst>
       <p:ext uri="{BB962C8B-B14F-4D97-AF65-F5344CB8AC3E}">
@@ -8230,35 +8774,49 @@
           <a:bodyPr/>
           <a:lstStyle/>
           <a:p>
-            <a:endParaRPr lang="zh-CN" altLang="en-US"/>
-          </a:p>
-        </p:txBody>
-      </p:sp>
-      <p:sp>
-        <p:nvSpPr>
-          <p:cNvPr id="3" name="内容占位符 2">
-            <a:extLst>
-              <a:ext uri="{FF2B5EF4-FFF2-40B4-BE49-F238E27FC236}">
-                <a16:creationId xmlns:a16="http://schemas.microsoft.com/office/drawing/2014/main" id="{C7FDCCFC-4F92-16F8-CD32-448656D98C8E}"/>
-              </a:ext>
-            </a:extLst>
-          </p:cNvPr>
-          <p:cNvSpPr>
-            <a:spLocks noGrp="1"/>
-          </p:cNvSpPr>
+            <a:r>
+              <a:rPr lang="en-US" altLang="zh-CN" dirty="0"/>
+              <a:t>Integration Result for ellipsoidal orbit</a:t>
+            </a:r>
+            <a:endParaRPr lang="zh-CN" altLang="en-US" dirty="0"/>
+          </a:p>
+        </p:txBody>
+      </p:sp>
+      <p:pic>
+        <p:nvPicPr>
+          <p:cNvPr id="6" name="内容占位符 5" descr="图表, 散点图&#10;&#10;描述已自动生成">
+            <a:extLst>
+              <a:ext uri="{FF2B5EF4-FFF2-40B4-BE49-F238E27FC236}">
+                <a16:creationId xmlns:a16="http://schemas.microsoft.com/office/drawing/2014/main" id="{317AFDAD-69FE-FFF9-A89F-249BDA30760F}"/>
+              </a:ext>
+            </a:extLst>
+          </p:cNvPr>
+          <p:cNvPicPr>
+            <a:picLocks noGrp="1" noChangeAspect="1"/>
+          </p:cNvPicPr>
           <p:nvPr>
             <p:ph idx="1"/>
           </p:nvPr>
-        </p:nvSpPr>
-        <p:spPr/>
-        <p:txBody>
-          <a:bodyPr/>
-          <a:lstStyle/>
-          <a:p>
-            <a:endParaRPr lang="zh-CN" altLang="en-US"/>
-          </a:p>
-        </p:txBody>
-      </p:sp>
+        </p:nvPicPr>
+        <p:blipFill>
+          <a:blip r:embed="rId2">
+            <a:extLst>
+              <a:ext uri="{28A0092B-C50C-407E-A947-70E740481C1C}">
+                <a14:useLocalDpi xmlns:a14="http://schemas.microsoft.com/office/drawing/2010/main" val="0"/>
+              </a:ext>
+            </a:extLst>
+          </a:blip>
+          <a:stretch>
+            <a:fillRect/>
+          </a:stretch>
+        </p:blipFill>
+        <p:spPr>
+          <a:xfrm>
+            <a:off x="685800" y="1196752"/>
+            <a:ext cx="8694496" cy="4243094"/>
+          </a:xfrm>
+        </p:spPr>
+      </p:pic>
       <p:sp>
         <p:nvSpPr>
           <p:cNvPr id="4" name="灯片编号占位符 3">
@@ -8345,35 +8903,49 @@
           <a:bodyPr/>
           <a:lstStyle/>
           <a:p>
-            <a:endParaRPr lang="zh-CN" altLang="en-US"/>
-          </a:p>
-        </p:txBody>
-      </p:sp>
-      <p:sp>
-        <p:nvSpPr>
-          <p:cNvPr id="3" name="内容占位符 2">
-            <a:extLst>
-              <a:ext uri="{FF2B5EF4-FFF2-40B4-BE49-F238E27FC236}">
-                <a16:creationId xmlns:a16="http://schemas.microsoft.com/office/drawing/2014/main" id="{C7FDCCFC-4F92-16F8-CD32-448656D98C8E}"/>
-              </a:ext>
-            </a:extLst>
-          </p:cNvPr>
-          <p:cNvSpPr>
-            <a:spLocks noGrp="1"/>
-          </p:cNvSpPr>
+            <a:r>
+              <a:rPr lang="en-US" altLang="zh-CN" dirty="0"/>
+              <a:t>Integration Result for ellipsoidal orbit</a:t>
+            </a:r>
+            <a:endParaRPr lang="zh-CN" altLang="en-US" dirty="0"/>
+          </a:p>
+        </p:txBody>
+      </p:sp>
+      <p:pic>
+        <p:nvPicPr>
+          <p:cNvPr id="6" name="内容占位符 5" descr="图表, 散点图&#10;&#10;描述已自动生成">
+            <a:extLst>
+              <a:ext uri="{FF2B5EF4-FFF2-40B4-BE49-F238E27FC236}">
+                <a16:creationId xmlns:a16="http://schemas.microsoft.com/office/drawing/2014/main" id="{2706EA07-3BF1-45CD-1833-D0EA86836643}"/>
+              </a:ext>
+            </a:extLst>
+          </p:cNvPr>
+          <p:cNvPicPr>
+            <a:picLocks noGrp="1" noChangeAspect="1"/>
+          </p:cNvPicPr>
           <p:nvPr>
             <p:ph idx="1"/>
           </p:nvPr>
-        </p:nvSpPr>
-        <p:spPr/>
-        <p:txBody>
-          <a:bodyPr/>
-          <a:lstStyle/>
-          <a:p>
-            <a:endParaRPr lang="zh-CN" altLang="en-US"/>
-          </a:p>
-        </p:txBody>
-      </p:sp>
+        </p:nvPicPr>
+        <p:blipFill>
+          <a:blip r:embed="rId2">
+            <a:extLst>
+              <a:ext uri="{28A0092B-C50C-407E-A947-70E740481C1C}">
+                <a14:useLocalDpi xmlns:a14="http://schemas.microsoft.com/office/drawing/2010/main" val="0"/>
+              </a:ext>
+            </a:extLst>
+          </a:blip>
+          <a:stretch>
+            <a:fillRect/>
+          </a:stretch>
+        </p:blipFill>
+        <p:spPr>
+          <a:xfrm>
+            <a:off x="685800" y="1188826"/>
+            <a:ext cx="8710736" cy="4251020"/>
+          </a:xfrm>
+        </p:spPr>
+      </p:pic>
       <p:sp>
         <p:nvSpPr>
           <p:cNvPr id="4" name="灯片编号占位符 3">
@@ -8460,35 +9032,49 @@
           <a:bodyPr/>
           <a:lstStyle/>
           <a:p>
-            <a:endParaRPr lang="zh-CN" altLang="en-US"/>
-          </a:p>
-        </p:txBody>
-      </p:sp>
-      <p:sp>
-        <p:nvSpPr>
-          <p:cNvPr id="3" name="内容占位符 2">
-            <a:extLst>
-              <a:ext uri="{FF2B5EF4-FFF2-40B4-BE49-F238E27FC236}">
-                <a16:creationId xmlns:a16="http://schemas.microsoft.com/office/drawing/2014/main" id="{C7FDCCFC-4F92-16F8-CD32-448656D98C8E}"/>
-              </a:ext>
-            </a:extLst>
-          </p:cNvPr>
-          <p:cNvSpPr>
-            <a:spLocks noGrp="1"/>
-          </p:cNvSpPr>
+            <a:r>
+              <a:rPr lang="en-US" altLang="zh-CN" sz="2800" dirty="0"/>
+              <a:t>Time for reentry with different parameters</a:t>
+            </a:r>
+            <a:endParaRPr lang="zh-CN" altLang="en-US" sz="2800" dirty="0"/>
+          </a:p>
+        </p:txBody>
+      </p:sp>
+      <p:pic>
+        <p:nvPicPr>
+          <p:cNvPr id="6" name="内容占位符 5" descr="背景图案&#10;&#10;中度可信度描述已自动生成">
+            <a:extLst>
+              <a:ext uri="{FF2B5EF4-FFF2-40B4-BE49-F238E27FC236}">
+                <a16:creationId xmlns:a16="http://schemas.microsoft.com/office/drawing/2014/main" id="{6B2FECD5-65A3-C136-FF6D-6E4BBD4D0E07}"/>
+              </a:ext>
+            </a:extLst>
+          </p:cNvPr>
+          <p:cNvPicPr>
+            <a:picLocks noGrp="1" noChangeAspect="1"/>
+          </p:cNvPicPr>
           <p:nvPr>
             <p:ph idx="1"/>
           </p:nvPr>
-        </p:nvSpPr>
-        <p:spPr/>
-        <p:txBody>
-          <a:bodyPr/>
-          <a:lstStyle/>
-          <a:p>
-            <a:endParaRPr lang="zh-CN" altLang="en-US"/>
-          </a:p>
-        </p:txBody>
-      </p:sp>
+        </p:nvPicPr>
+        <p:blipFill>
+          <a:blip r:embed="rId2">
+            <a:extLst>
+              <a:ext uri="{28A0092B-C50C-407E-A947-70E740481C1C}">
+                <a14:useLocalDpi xmlns:a14="http://schemas.microsoft.com/office/drawing/2010/main" val="0"/>
+              </a:ext>
+            </a:extLst>
+          </a:blip>
+          <a:stretch>
+            <a:fillRect/>
+          </a:stretch>
+        </p:blipFill>
+        <p:spPr>
+          <a:xfrm>
+            <a:off x="505272" y="1628800"/>
+            <a:ext cx="8638728" cy="4215878"/>
+          </a:xfrm>
+        </p:spPr>
+      </p:pic>
       <p:sp>
         <p:nvSpPr>
           <p:cNvPr id="4" name="灯片编号占位符 3">
@@ -8575,35 +9161,49 @@
           <a:bodyPr/>
           <a:lstStyle/>
           <a:p>
-            <a:endParaRPr lang="zh-CN" altLang="en-US"/>
-          </a:p>
-        </p:txBody>
-      </p:sp>
-      <p:sp>
-        <p:nvSpPr>
-          <p:cNvPr id="3" name="内容占位符 2">
-            <a:extLst>
-              <a:ext uri="{FF2B5EF4-FFF2-40B4-BE49-F238E27FC236}">
-                <a16:creationId xmlns:a16="http://schemas.microsoft.com/office/drawing/2014/main" id="{C7FDCCFC-4F92-16F8-CD32-448656D98C8E}"/>
-              </a:ext>
-            </a:extLst>
-          </p:cNvPr>
-          <p:cNvSpPr>
-            <a:spLocks noGrp="1"/>
-          </p:cNvSpPr>
+            <a:r>
+              <a:rPr lang="de-DE" altLang="zh-CN" dirty="0"/>
+              <a:t>Why we are interested</a:t>
+            </a:r>
+            <a:endParaRPr lang="zh-CN" altLang="en-US" dirty="0"/>
+          </a:p>
+        </p:txBody>
+      </p:sp>
+      <p:pic>
+        <p:nvPicPr>
+          <p:cNvPr id="6" name="内容占位符 5" descr="文本&#10;&#10;描述已自动生成">
+            <a:extLst>
+              <a:ext uri="{FF2B5EF4-FFF2-40B4-BE49-F238E27FC236}">
+                <a16:creationId xmlns:a16="http://schemas.microsoft.com/office/drawing/2014/main" id="{461FFE30-0FEA-831F-254F-459774E545F0}"/>
+              </a:ext>
+            </a:extLst>
+          </p:cNvPr>
+          <p:cNvPicPr>
+            <a:picLocks noGrp="1" noChangeAspect="1"/>
+          </p:cNvPicPr>
           <p:nvPr>
             <p:ph idx="1"/>
           </p:nvPr>
-        </p:nvSpPr>
-        <p:spPr/>
-        <p:txBody>
-          <a:bodyPr/>
-          <a:lstStyle/>
-          <a:p>
-            <a:endParaRPr lang="zh-CN" altLang="en-US"/>
-          </a:p>
-        </p:txBody>
-      </p:sp>
+        </p:nvPicPr>
+        <p:blipFill>
+          <a:blip r:embed="rId2">
+            <a:extLst>
+              <a:ext uri="{28A0092B-C50C-407E-A947-70E740481C1C}">
+                <a14:useLocalDpi xmlns:a14="http://schemas.microsoft.com/office/drawing/2010/main" val="0"/>
+              </a:ext>
+            </a:extLst>
+          </a:blip>
+          <a:stretch>
+            <a:fillRect/>
+          </a:stretch>
+        </p:blipFill>
+        <p:spPr>
+          <a:xfrm>
+            <a:off x="899592" y="955576"/>
+            <a:ext cx="5976664" cy="4472133"/>
+          </a:xfrm>
+        </p:spPr>
+      </p:pic>
       <p:sp>
         <p:nvSpPr>
           <p:cNvPr id="4" name="灯片编号占位符 3">
@@ -9840,32 +10440,11 @@
           <a:bodyPr/>
           <a:lstStyle/>
           <a:p>
-            <a:endParaRPr lang="zh-CN" altLang="en-US"/>
-          </a:p>
-        </p:txBody>
-      </p:sp>
-      <p:sp>
-        <p:nvSpPr>
-          <p:cNvPr id="3" name="内容占位符 2">
-            <a:extLst>
-              <a:ext uri="{FF2B5EF4-FFF2-40B4-BE49-F238E27FC236}">
-                <a16:creationId xmlns:a16="http://schemas.microsoft.com/office/drawing/2014/main" id="{C7FDCCFC-4F92-16F8-CD32-448656D98C8E}"/>
-              </a:ext>
-            </a:extLst>
-          </p:cNvPr>
-          <p:cNvSpPr>
-            <a:spLocks noGrp="1"/>
-          </p:cNvSpPr>
-          <p:nvPr>
-            <p:ph idx="1"/>
-          </p:nvPr>
-        </p:nvSpPr>
-        <p:spPr/>
-        <p:txBody>
-          <a:bodyPr/>
-          <a:lstStyle/>
-          <a:p>
-            <a:endParaRPr lang="zh-CN" altLang="en-US"/>
+            <a:r>
+              <a:rPr lang="de-DE" altLang="zh-CN" dirty="0"/>
+              <a:t>Objects counting</a:t>
+            </a:r>
+            <a:endParaRPr lang="zh-CN" altLang="en-US" dirty="0"/>
           </a:p>
         </p:txBody>
       </p:sp>
@@ -9904,6 +10483,41 @@
           </a:p>
         </p:txBody>
       </p:sp>
+      <p:pic>
+        <p:nvPicPr>
+          <p:cNvPr id="9" name="内容占位符 8" descr="图表, 直方图&#10;&#10;描述已自动生成">
+            <a:extLst>
+              <a:ext uri="{FF2B5EF4-FFF2-40B4-BE49-F238E27FC236}">
+                <a16:creationId xmlns:a16="http://schemas.microsoft.com/office/drawing/2014/main" id="{C16674A1-C3F1-CCC8-5457-D34A8DC24EB1}"/>
+              </a:ext>
+            </a:extLst>
+          </p:cNvPr>
+          <p:cNvPicPr>
+            <a:picLocks noGrp="1" noChangeAspect="1"/>
+          </p:cNvPicPr>
+          <p:nvPr>
+            <p:ph idx="1"/>
+          </p:nvPr>
+        </p:nvPicPr>
+        <p:blipFill>
+          <a:blip r:embed="rId2">
+            <a:extLst>
+              <a:ext uri="{28A0092B-C50C-407E-A947-70E740481C1C}">
+                <a14:useLocalDpi xmlns:a14="http://schemas.microsoft.com/office/drawing/2010/main" val="0"/>
+              </a:ext>
+            </a:extLst>
+          </a:blip>
+          <a:stretch>
+            <a:fillRect/>
+          </a:stretch>
+        </p:blipFill>
+        <p:spPr>
+          <a:xfrm>
+            <a:off x="685800" y="1570554"/>
+            <a:ext cx="7772400" cy="3793092"/>
+          </a:xfrm>
+        </p:spPr>
+      </p:pic>
     </p:spTree>
     <p:extLst>
       <p:ext uri="{BB962C8B-B14F-4D97-AF65-F5344CB8AC3E}">
@@ -11105,35 +11719,49 @@
           <a:bodyPr/>
           <a:lstStyle/>
           <a:p>
-            <a:endParaRPr lang="zh-CN" altLang="en-US"/>
-          </a:p>
-        </p:txBody>
-      </p:sp>
-      <p:sp>
-        <p:nvSpPr>
-          <p:cNvPr id="3" name="内容占位符 2">
-            <a:extLst>
-              <a:ext uri="{FF2B5EF4-FFF2-40B4-BE49-F238E27FC236}">
-                <a16:creationId xmlns:a16="http://schemas.microsoft.com/office/drawing/2014/main" id="{C7FDCCFC-4F92-16F8-CD32-448656D98C8E}"/>
-              </a:ext>
-            </a:extLst>
-          </p:cNvPr>
-          <p:cNvSpPr>
-            <a:spLocks noGrp="1"/>
-          </p:cNvSpPr>
+            <a:r>
+              <a:rPr lang="de-DE" altLang="zh-CN" dirty="0"/>
+              <a:t>Objects classification in 2022</a:t>
+            </a:r>
+            <a:endParaRPr lang="zh-CN" altLang="en-US" dirty="0"/>
+          </a:p>
+        </p:txBody>
+      </p:sp>
+      <p:pic>
+        <p:nvPicPr>
+          <p:cNvPr id="6" name="内容占位符 5" descr="图表, 条形图&#10;&#10;描述已自动生成">
+            <a:extLst>
+              <a:ext uri="{FF2B5EF4-FFF2-40B4-BE49-F238E27FC236}">
+                <a16:creationId xmlns:a16="http://schemas.microsoft.com/office/drawing/2014/main" id="{B0C39D42-B189-A289-55E9-215E16ADF4C8}"/>
+              </a:ext>
+            </a:extLst>
+          </p:cNvPr>
+          <p:cNvPicPr>
+            <a:picLocks noGrp="1" noChangeAspect="1"/>
+          </p:cNvPicPr>
           <p:nvPr>
             <p:ph idx="1"/>
           </p:nvPr>
-        </p:nvSpPr>
-        <p:spPr/>
-        <p:txBody>
-          <a:bodyPr/>
-          <a:lstStyle/>
-          <a:p>
-            <a:endParaRPr lang="zh-CN" altLang="en-US"/>
-          </a:p>
-        </p:txBody>
-      </p:sp>
+        </p:nvPicPr>
+        <p:blipFill>
+          <a:blip r:embed="rId2">
+            <a:extLst>
+              <a:ext uri="{28A0092B-C50C-407E-A947-70E740481C1C}">
+                <a14:useLocalDpi xmlns:a14="http://schemas.microsoft.com/office/drawing/2010/main" val="0"/>
+              </a:ext>
+            </a:extLst>
+          </a:blip>
+          <a:stretch>
+            <a:fillRect/>
+          </a:stretch>
+        </p:blipFill>
+        <p:spPr>
+          <a:xfrm>
+            <a:off x="827584" y="1700808"/>
+            <a:ext cx="7772400" cy="3793092"/>
+          </a:xfrm>
+        </p:spPr>
+      </p:pic>
       <p:sp>
         <p:nvSpPr>
           <p:cNvPr id="4" name="灯片编号占位符 3">
@@ -12370,7 +12998,15 @@
           <a:bodyPr/>
           <a:lstStyle/>
           <a:p>
-            <a:endParaRPr lang="zh-CN" altLang="en-US"/>
+            <a:r>
+              <a:rPr lang="en-US" altLang="zh-CN" dirty="0"/>
+              <a:t>For </a:t>
+            </a:r>
+            <a:r>
+              <a:rPr lang="en-US" altLang="zh-CN" dirty="0" err="1"/>
+              <a:t>Jiaxin</a:t>
+            </a:r>
+            <a:endParaRPr lang="zh-CN" altLang="en-US" dirty="0"/>
           </a:p>
         </p:txBody>
       </p:sp>
@@ -12395,7 +13031,7 @@
           <a:bodyPr/>
           <a:lstStyle/>
           <a:p>
-            <a:endParaRPr lang="zh-CN" altLang="en-US"/>
+            <a:endParaRPr lang="zh-CN" altLang="en-US" dirty="0"/>
           </a:p>
         </p:txBody>
       </p:sp>
@@ -13635,32 +14271,11 @@
           <a:bodyPr/>
           <a:lstStyle/>
           <a:p>
-            <a:endParaRPr lang="zh-CN" altLang="en-US"/>
-          </a:p>
-        </p:txBody>
-      </p:sp>
-      <p:sp>
-        <p:nvSpPr>
-          <p:cNvPr id="3" name="内容占位符 2">
-            <a:extLst>
-              <a:ext uri="{FF2B5EF4-FFF2-40B4-BE49-F238E27FC236}">
-                <a16:creationId xmlns:a16="http://schemas.microsoft.com/office/drawing/2014/main" id="{C7FDCCFC-4F92-16F8-CD32-448656D98C8E}"/>
-              </a:ext>
-            </a:extLst>
-          </p:cNvPr>
-          <p:cNvSpPr>
-            <a:spLocks noGrp="1"/>
-          </p:cNvSpPr>
-          <p:nvPr>
-            <p:ph idx="1"/>
-          </p:nvPr>
-        </p:nvSpPr>
-        <p:spPr/>
-        <p:txBody>
-          <a:bodyPr/>
-          <a:lstStyle/>
-          <a:p>
-            <a:endParaRPr lang="zh-CN" altLang="en-US"/>
+            <a:r>
+              <a:rPr lang="en-US" altLang="zh-CN" dirty="0"/>
+              <a:t>Atmospheric influence</a:t>
+            </a:r>
+            <a:endParaRPr lang="zh-CN" altLang="en-US" dirty="0"/>
           </a:p>
         </p:txBody>
       </p:sp>
@@ -13699,6 +14314,291 @@
           </a:p>
         </p:txBody>
       </p:sp>
+      <p:pic>
+        <p:nvPicPr>
+          <p:cNvPr id="12" name="内容占位符 11" descr="手机屏幕截图&#10;&#10;中度可信度描述已自动生成">
+            <a:extLst>
+              <a:ext uri="{FF2B5EF4-FFF2-40B4-BE49-F238E27FC236}">
+                <a16:creationId xmlns:a16="http://schemas.microsoft.com/office/drawing/2014/main" id="{6EBCEACF-A474-B475-BD06-EC3991CD7FFC}"/>
+              </a:ext>
+            </a:extLst>
+          </p:cNvPr>
+          <p:cNvPicPr>
+            <a:picLocks noGrp="1" noChangeAspect="1"/>
+          </p:cNvPicPr>
+          <p:nvPr>
+            <p:ph idx="1"/>
+          </p:nvPr>
+        </p:nvPicPr>
+        <p:blipFill>
+          <a:blip r:embed="rId2">
+            <a:extLst>
+              <a:ext uri="{28A0092B-C50C-407E-A947-70E740481C1C}">
+                <a14:useLocalDpi xmlns:a14="http://schemas.microsoft.com/office/drawing/2010/main" val="0"/>
+              </a:ext>
+            </a:extLst>
+          </a:blip>
+          <a:stretch>
+            <a:fillRect/>
+          </a:stretch>
+        </p:blipFill>
+        <p:spPr>
+          <a:xfrm>
+            <a:off x="2603110" y="1772816"/>
+            <a:ext cx="4892464" cy="868755"/>
+          </a:xfrm>
+        </p:spPr>
+      </p:pic>
+      <mc:AlternateContent xmlns:mc="http://schemas.openxmlformats.org/markup-compatibility/2006">
+        <mc:Choice xmlns:a14="http://schemas.microsoft.com/office/drawing/2010/main" Requires="a14">
+          <p:sp>
+            <p:nvSpPr>
+              <p:cNvPr id="13" name="文本框 12">
+                <a:extLst>
+                  <a:ext uri="{FF2B5EF4-FFF2-40B4-BE49-F238E27FC236}">
+                    <a16:creationId xmlns:a16="http://schemas.microsoft.com/office/drawing/2014/main" id="{3DBF88AA-6442-1A4A-E2C1-24F504E475DA}"/>
+                  </a:ext>
+                </a:extLst>
+              </p:cNvPr>
+              <p:cNvSpPr txBox="1"/>
+              <p:nvPr/>
+            </p:nvSpPr>
+            <p:spPr>
+              <a:xfrm>
+                <a:off x="899592" y="3433773"/>
+                <a:ext cx="8130752" cy="3031407"/>
+              </a:xfrm>
+              <a:prstGeom prst="rect">
+                <a:avLst/>
+              </a:prstGeom>
+              <a:noFill/>
+            </p:spPr>
+            <p:txBody>
+              <a:bodyPr wrap="none" rtlCol="0">
+                <a:spAutoFit/>
+              </a:bodyPr>
+              <a:lstStyle/>
+              <a:p>
+                <a14:m>
+                  <m:oMath xmlns:m="http://schemas.openxmlformats.org/officeDocument/2006/math">
+                    <m:sSub>
+                      <m:sSubPr>
+                        <m:ctrlPr>
+                          <a:rPr lang="en-US" altLang="zh-CN" sz="2000" b="0" i="1" smtClean="0">
+                            <a:latin typeface="Cambria Math" panose="02040503050406030204" pitchFamily="18" charset="0"/>
+                          </a:rPr>
+                        </m:ctrlPr>
+                      </m:sSubPr>
+                      <m:e>
+                        <m:r>
+                          <a:rPr lang="en-US" altLang="zh-CN" sz="2000" b="0" i="1" smtClean="0">
+                            <a:latin typeface="Cambria Math" panose="02040503050406030204" pitchFamily="18" charset="0"/>
+                          </a:rPr>
+                          <m:t>𝐶</m:t>
+                        </m:r>
+                      </m:e>
+                      <m:sub>
+                        <m:r>
+                          <a:rPr lang="en-US" altLang="zh-CN" sz="2000" b="0" i="1" smtClean="0">
+                            <a:latin typeface="Cambria Math" panose="02040503050406030204" pitchFamily="18" charset="0"/>
+                          </a:rPr>
+                          <m:t>𝑑</m:t>
+                        </m:r>
+                      </m:sub>
+                    </m:sSub>
+                  </m:oMath>
+                </a14:m>
+                <a:r>
+                  <a:rPr lang="en-US" altLang="zh-CN" sz="2000" b="0" dirty="0"/>
+                  <a:t>: describes the shape of the objects (Example: 1 for sphere and 2.5 for ISS)</a:t>
+                </a:r>
+              </a:p>
+              <a:p>
+                <a14:m>
+                  <m:oMath xmlns:m="http://schemas.openxmlformats.org/officeDocument/2006/math">
+                    <m:r>
+                      <a:rPr lang="zh-CN" altLang="en-US" sz="2000" b="0" i="1" smtClean="0">
+                        <a:latin typeface="Cambria Math" panose="02040503050406030204" pitchFamily="18" charset="0"/>
+                      </a:rPr>
+                      <m:t>𝜌</m:t>
+                    </m:r>
+                  </m:oMath>
+                </a14:m>
+                <a:r>
+                  <a:rPr lang="en-US" altLang="zh-CN" sz="2000" b="0" dirty="0"/>
+                  <a:t>: atmosphere density</a:t>
+                </a:r>
+              </a:p>
+              <a:p>
+                <a14:m>
+                  <m:oMath xmlns:m="http://schemas.openxmlformats.org/officeDocument/2006/math">
+                    <m:f>
+                      <m:fPr>
+                        <m:ctrlPr>
+                          <a:rPr lang="en-US" altLang="zh-CN" sz="2000" b="0" i="1" smtClean="0">
+                            <a:latin typeface="Cambria Math" panose="02040503050406030204" pitchFamily="18" charset="0"/>
+                          </a:rPr>
+                        </m:ctrlPr>
+                      </m:fPr>
+                      <m:num>
+                        <m:r>
+                          <a:rPr lang="en-US" altLang="zh-CN" sz="2000" b="0" i="1" smtClean="0">
+                            <a:latin typeface="Cambria Math" panose="02040503050406030204" pitchFamily="18" charset="0"/>
+                          </a:rPr>
+                          <m:t>𝐴</m:t>
+                        </m:r>
+                      </m:num>
+                      <m:den>
+                        <m:r>
+                          <a:rPr lang="en-US" altLang="zh-CN" sz="2000" b="0" i="1" smtClean="0">
+                            <a:latin typeface="Cambria Math" panose="02040503050406030204" pitchFamily="18" charset="0"/>
+                          </a:rPr>
+                          <m:t>𝑚</m:t>
+                        </m:r>
+                      </m:den>
+                    </m:f>
+                  </m:oMath>
+                </a14:m>
+                <a:r>
+                  <a:rPr lang="en-US" altLang="zh-CN" sz="2000" b="0" dirty="0"/>
+                  <a:t>: section area to mass ratio</a:t>
+                </a:r>
+              </a:p>
+              <a:p>
+                <a14:m>
+                  <m:oMath xmlns:m="http://schemas.openxmlformats.org/officeDocument/2006/math">
+                    <m:acc>
+                      <m:accPr>
+                        <m:chr m:val="̇"/>
+                        <m:ctrlPr>
+                          <a:rPr lang="en-US" altLang="zh-CN" sz="2000" b="1" i="1" smtClean="0">
+                            <a:latin typeface="Cambria Math" panose="02040503050406030204" pitchFamily="18" charset="0"/>
+                          </a:rPr>
+                        </m:ctrlPr>
+                      </m:accPr>
+                      <m:e>
+                        <m:r>
+                          <a:rPr lang="en-US" altLang="zh-CN" sz="2000" b="1" i="1" smtClean="0">
+                            <a:latin typeface="Cambria Math" panose="02040503050406030204" pitchFamily="18" charset="0"/>
+                          </a:rPr>
+                          <m:t>𝒓</m:t>
+                        </m:r>
+                      </m:e>
+                    </m:acc>
+                  </m:oMath>
+                </a14:m>
+                <a:r>
+                  <a:rPr lang="en-US" altLang="zh-CN" sz="2000" b="0" dirty="0"/>
+                  <a:t>: object velocity</a:t>
+                </a:r>
+              </a:p>
+              <a:p>
+                <a14:m>
+                  <m:oMath xmlns:m="http://schemas.openxmlformats.org/officeDocument/2006/math">
+                    <m:sSub>
+                      <m:sSubPr>
+                        <m:ctrlPr>
+                          <a:rPr lang="en-US" altLang="zh-CN" sz="2000" b="1" i="1" smtClean="0">
+                            <a:latin typeface="Cambria Math" panose="02040503050406030204" pitchFamily="18" charset="0"/>
+                          </a:rPr>
+                        </m:ctrlPr>
+                      </m:sSubPr>
+                      <m:e>
+                        <m:acc>
+                          <m:accPr>
+                            <m:chr m:val="̇"/>
+                            <m:ctrlPr>
+                              <a:rPr lang="en-US" altLang="zh-CN" sz="2000" b="1" i="1" smtClean="0">
+                                <a:latin typeface="Cambria Math" panose="02040503050406030204" pitchFamily="18" charset="0"/>
+                              </a:rPr>
+                            </m:ctrlPr>
+                          </m:accPr>
+                          <m:e>
+                            <m:r>
+                              <a:rPr lang="en-US" altLang="zh-CN" sz="2000" b="1" i="1" smtClean="0">
+                                <a:latin typeface="Cambria Math" panose="02040503050406030204" pitchFamily="18" charset="0"/>
+                              </a:rPr>
+                              <m:t>𝒓</m:t>
+                            </m:r>
+                          </m:e>
+                        </m:acc>
+                      </m:e>
+                      <m:sub>
+                        <m:r>
+                          <a:rPr lang="en-US" altLang="zh-CN" sz="2000" b="1" i="1" smtClean="0">
+                            <a:latin typeface="Cambria Math" panose="02040503050406030204" pitchFamily="18" charset="0"/>
+                          </a:rPr>
+                          <m:t>𝒂</m:t>
+                        </m:r>
+                      </m:sub>
+                    </m:sSub>
+                  </m:oMath>
+                </a14:m>
+                <a:r>
+                  <a:rPr lang="en-US" altLang="zh-CN" sz="2000" b="0" dirty="0"/>
+                  <a:t>: atmosphere velocity</a:t>
+                </a:r>
+              </a:p>
+              <a:p>
+                <a:endParaRPr lang="en-US" altLang="zh-CN" sz="2000" b="0" dirty="0"/>
+              </a:p>
+              <a:p>
+                <a:endParaRPr lang="en-US" altLang="zh-CN" sz="2000" b="0" dirty="0"/>
+              </a:p>
+              <a:p>
+                <a:endParaRPr lang="en-US" altLang="zh-CN" sz="2000" b="0" dirty="0"/>
+              </a:p>
+              <a:p>
+                <a:endParaRPr lang="zh-CN" altLang="en-US" sz="2000" dirty="0"/>
+              </a:p>
+            </p:txBody>
+          </p:sp>
+        </mc:Choice>
+        <mc:Fallback>
+          <p:sp>
+            <p:nvSpPr>
+              <p:cNvPr id="13" name="文本框 12">
+                <a:extLst>
+                  <a:ext uri="{FF2B5EF4-FFF2-40B4-BE49-F238E27FC236}">
+                    <a16:creationId xmlns:a16="http://schemas.microsoft.com/office/drawing/2014/main" id="{3DBF88AA-6442-1A4A-E2C1-24F504E475DA}"/>
+                  </a:ext>
+                </a:extLst>
+              </p:cNvPr>
+              <p:cNvSpPr txBox="1">
+                <a:spLocks noRot="1" noChangeAspect="1" noMove="1" noResize="1" noEditPoints="1" noAdjustHandles="1" noChangeArrowheads="1" noChangeShapeType="1" noTextEdit="1"/>
+              </p:cNvSpPr>
+              <p:nvPr/>
+            </p:nvSpPr>
+            <p:spPr>
+              <a:xfrm>
+                <a:off x="899592" y="3433773"/>
+                <a:ext cx="8130752" cy="3031407"/>
+              </a:xfrm>
+              <a:prstGeom prst="rect">
+                <a:avLst/>
+              </a:prstGeom>
+              <a:blipFill>
+                <a:blip r:embed="rId3"/>
+                <a:stretch>
+                  <a:fillRect t="-1004"/>
+                </a:stretch>
+              </a:blipFill>
+            </p:spPr>
+            <p:txBody>
+              <a:bodyPr/>
+              <a:lstStyle/>
+              <a:p>
+                <a:r>
+                  <a:rPr lang="zh-CN" altLang="en-US">
+                    <a:noFill/>
+                  </a:rPr>
+                  <a:t> </a:t>
+                </a:r>
+              </a:p>
+            </p:txBody>
+          </p:sp>
+        </mc:Fallback>
+      </mc:AlternateContent>
     </p:spTree>
     <p:extLst>
       <p:ext uri="{BB962C8B-B14F-4D97-AF65-F5344CB8AC3E}">
@@ -13750,35 +14650,49 @@
           <a:bodyPr/>
           <a:lstStyle/>
           <a:p>
-            <a:endParaRPr lang="zh-CN" altLang="en-US"/>
-          </a:p>
-        </p:txBody>
-      </p:sp>
-      <p:sp>
-        <p:nvSpPr>
-          <p:cNvPr id="3" name="内容占位符 2">
-            <a:extLst>
-              <a:ext uri="{FF2B5EF4-FFF2-40B4-BE49-F238E27FC236}">
-                <a16:creationId xmlns:a16="http://schemas.microsoft.com/office/drawing/2014/main" id="{C7FDCCFC-4F92-16F8-CD32-448656D98C8E}"/>
-              </a:ext>
-            </a:extLst>
-          </p:cNvPr>
-          <p:cNvSpPr>
-            <a:spLocks noGrp="1"/>
-          </p:cNvSpPr>
+            <a:r>
+              <a:rPr lang="en-US" altLang="zh-CN" dirty="0"/>
+              <a:t>Atmosphere model compare</a:t>
+            </a:r>
+            <a:endParaRPr lang="zh-CN" altLang="en-US" dirty="0"/>
+          </a:p>
+        </p:txBody>
+      </p:sp>
+      <p:pic>
+        <p:nvPicPr>
+          <p:cNvPr id="6" name="内容占位符 5" descr="图表&#10;&#10;描述已自动生成">
+            <a:extLst>
+              <a:ext uri="{FF2B5EF4-FFF2-40B4-BE49-F238E27FC236}">
+                <a16:creationId xmlns:a16="http://schemas.microsoft.com/office/drawing/2014/main" id="{DCE06B4A-F0C9-74EB-0C7C-406EAC07E086}"/>
+              </a:ext>
+            </a:extLst>
+          </p:cNvPr>
+          <p:cNvPicPr>
+            <a:picLocks noGrp="1" noChangeAspect="1"/>
+          </p:cNvPicPr>
           <p:nvPr>
             <p:ph idx="1"/>
           </p:nvPr>
-        </p:nvSpPr>
-        <p:spPr/>
-        <p:txBody>
-          <a:bodyPr/>
-          <a:lstStyle/>
-          <a:p>
-            <a:endParaRPr lang="zh-CN" altLang="en-US"/>
-          </a:p>
-        </p:txBody>
-      </p:sp>
+        </p:nvPicPr>
+        <p:blipFill>
+          <a:blip r:embed="rId2">
+            <a:extLst>
+              <a:ext uri="{28A0092B-C50C-407E-A947-70E740481C1C}">
+                <a14:useLocalDpi xmlns:a14="http://schemas.microsoft.com/office/drawing/2010/main" val="0"/>
+              </a:ext>
+            </a:extLst>
+          </a:blip>
+          <a:stretch>
+            <a:fillRect/>
+          </a:stretch>
+        </p:blipFill>
+        <p:spPr>
+          <a:xfrm>
+            <a:off x="685800" y="1646754"/>
+            <a:ext cx="7772400" cy="3793092"/>
+          </a:xfrm>
+        </p:spPr>
+      </p:pic>
       <p:sp>
         <p:nvSpPr>
           <p:cNvPr id="4" name="灯片编号占位符 3">
@@ -13865,35 +14779,49 @@
           <a:bodyPr/>
           <a:lstStyle/>
           <a:p>
-            <a:endParaRPr lang="zh-CN" altLang="en-US"/>
-          </a:p>
-        </p:txBody>
-      </p:sp>
-      <p:sp>
-        <p:nvSpPr>
-          <p:cNvPr id="3" name="内容占位符 2">
-            <a:extLst>
-              <a:ext uri="{FF2B5EF4-FFF2-40B4-BE49-F238E27FC236}">
-                <a16:creationId xmlns:a16="http://schemas.microsoft.com/office/drawing/2014/main" id="{C7FDCCFC-4F92-16F8-CD32-448656D98C8E}"/>
-              </a:ext>
-            </a:extLst>
-          </p:cNvPr>
-          <p:cNvSpPr>
-            <a:spLocks noGrp="1"/>
-          </p:cNvSpPr>
+            <a:r>
+              <a:rPr lang="en-US" altLang="zh-CN" dirty="0"/>
+              <a:t>Atmosphere model compare</a:t>
+            </a:r>
+            <a:endParaRPr lang="zh-CN" altLang="en-US" dirty="0"/>
+          </a:p>
+        </p:txBody>
+      </p:sp>
+      <p:pic>
+        <p:nvPicPr>
+          <p:cNvPr id="6" name="内容占位符 5" descr="图表, 折线图&#10;&#10;描述已自动生成">
+            <a:extLst>
+              <a:ext uri="{FF2B5EF4-FFF2-40B4-BE49-F238E27FC236}">
+                <a16:creationId xmlns:a16="http://schemas.microsoft.com/office/drawing/2014/main" id="{703EC2CB-C8D5-37D4-8167-8052A18B3BEE}"/>
+              </a:ext>
+            </a:extLst>
+          </p:cNvPr>
+          <p:cNvPicPr>
+            <a:picLocks noGrp="1" noChangeAspect="1"/>
+          </p:cNvPicPr>
           <p:nvPr>
             <p:ph idx="1"/>
           </p:nvPr>
-        </p:nvSpPr>
-        <p:spPr/>
-        <p:txBody>
-          <a:bodyPr/>
-          <a:lstStyle/>
-          <a:p>
-            <a:endParaRPr lang="zh-CN" altLang="en-US"/>
-          </a:p>
-        </p:txBody>
-      </p:sp>
+        </p:nvPicPr>
+        <p:blipFill>
+          <a:blip r:embed="rId2">
+            <a:extLst>
+              <a:ext uri="{28A0092B-C50C-407E-A947-70E740481C1C}">
+                <a14:useLocalDpi xmlns:a14="http://schemas.microsoft.com/office/drawing/2010/main" val="0"/>
+              </a:ext>
+            </a:extLst>
+          </a:blip>
+          <a:stretch>
+            <a:fillRect/>
+          </a:stretch>
+        </p:blipFill>
+        <p:spPr>
+          <a:xfrm>
+            <a:off x="685800" y="1646754"/>
+            <a:ext cx="7772400" cy="3793092"/>
+          </a:xfrm>
+        </p:spPr>
+      </p:pic>
       <p:sp>
         <p:nvSpPr>
           <p:cNvPr id="4" name="灯片编号占位符 3">
@@ -13980,35 +14908,49 @@
           <a:bodyPr/>
           <a:lstStyle/>
           <a:p>
-            <a:endParaRPr lang="zh-CN" altLang="en-US"/>
-          </a:p>
-        </p:txBody>
-      </p:sp>
-      <p:sp>
-        <p:nvSpPr>
-          <p:cNvPr id="3" name="内容占位符 2">
-            <a:extLst>
-              <a:ext uri="{FF2B5EF4-FFF2-40B4-BE49-F238E27FC236}">
-                <a16:creationId xmlns:a16="http://schemas.microsoft.com/office/drawing/2014/main" id="{C7FDCCFC-4F92-16F8-CD32-448656D98C8E}"/>
-              </a:ext>
-            </a:extLst>
-          </p:cNvPr>
-          <p:cNvSpPr>
-            <a:spLocks noGrp="1"/>
-          </p:cNvSpPr>
+            <a:r>
+              <a:rPr lang="en-US" altLang="zh-CN" dirty="0"/>
+              <a:t>msise00 model</a:t>
+            </a:r>
+            <a:endParaRPr lang="zh-CN" altLang="en-US" dirty="0"/>
+          </a:p>
+        </p:txBody>
+      </p:sp>
+      <p:pic>
+        <p:nvPicPr>
+          <p:cNvPr id="6" name="内容占位符 5" descr="图表&#10;&#10;描述已自动生成">
+            <a:extLst>
+              <a:ext uri="{FF2B5EF4-FFF2-40B4-BE49-F238E27FC236}">
+                <a16:creationId xmlns:a16="http://schemas.microsoft.com/office/drawing/2014/main" id="{CF4650C3-1822-5C72-F47C-26ADB73DFF47}"/>
+              </a:ext>
+            </a:extLst>
+          </p:cNvPr>
+          <p:cNvPicPr>
+            <a:picLocks noGrp="1" noChangeAspect="1"/>
+          </p:cNvPicPr>
           <p:nvPr>
             <p:ph idx="1"/>
           </p:nvPr>
-        </p:nvSpPr>
-        <p:spPr/>
-        <p:txBody>
-          <a:bodyPr/>
-          <a:lstStyle/>
-          <a:p>
-            <a:endParaRPr lang="zh-CN" altLang="en-US"/>
-          </a:p>
-        </p:txBody>
-      </p:sp>
+        </p:nvPicPr>
+        <p:blipFill>
+          <a:blip r:embed="rId2">
+            <a:extLst>
+              <a:ext uri="{28A0092B-C50C-407E-A947-70E740481C1C}">
+                <a14:useLocalDpi xmlns:a14="http://schemas.microsoft.com/office/drawing/2010/main" val="0"/>
+              </a:ext>
+            </a:extLst>
+          </a:blip>
+          <a:stretch>
+            <a:fillRect/>
+          </a:stretch>
+        </p:blipFill>
+        <p:spPr>
+          <a:xfrm>
+            <a:off x="1835696" y="908720"/>
+            <a:ext cx="5854235" cy="2856988"/>
+          </a:xfrm>
+        </p:spPr>
+      </p:pic>
       <p:sp>
         <p:nvSpPr>
           <p:cNvPr id="4" name="灯片编号占位符 3">
@@ -14044,6 +14986,65 @@
           </a:p>
         </p:txBody>
       </p:sp>
+      <p:pic>
+        <p:nvPicPr>
+          <p:cNvPr id="7" name="内容占位符 5" descr="图表&#10;&#10;描述已自动生成">
+            <a:extLst>
+              <a:ext uri="{FF2B5EF4-FFF2-40B4-BE49-F238E27FC236}">
+                <a16:creationId xmlns:a16="http://schemas.microsoft.com/office/drawing/2014/main" id="{1FA9921D-036E-A793-150A-6D372F6D2AB7}"/>
+              </a:ext>
+            </a:extLst>
+          </p:cNvPr>
+          <p:cNvPicPr>
+            <a:picLocks noChangeAspect="1"/>
+          </p:cNvPicPr>
+          <p:nvPr/>
+        </p:nvPicPr>
+        <p:blipFill>
+          <a:blip r:embed="rId3">
+            <a:extLst>
+              <a:ext uri="{28A0092B-C50C-407E-A947-70E740481C1C}">
+                <a14:useLocalDpi xmlns:a14="http://schemas.microsoft.com/office/drawing/2010/main" val="0"/>
+              </a:ext>
+            </a:extLst>
+          </a:blip>
+          <a:stretch>
+            <a:fillRect/>
+          </a:stretch>
+        </p:blipFill>
+        <p:spPr bwMode="auto">
+          <a:xfrm>
+            <a:off x="1832247" y="3813207"/>
+            <a:ext cx="5854236" cy="2856988"/>
+          </a:xfrm>
+          <a:prstGeom prst="rect">
+            <a:avLst/>
+          </a:prstGeom>
+          <a:noFill/>
+          <a:ln>
+            <a:noFill/>
+          </a:ln>
+          <a:extLst>
+            <a:ext uri="{909E8E84-426E-40DD-AFC4-6F175D3DCCD1}">
+              <a14:hiddenFill xmlns:a14="http://schemas.microsoft.com/office/drawing/2010/main">
+                <a:solidFill>
+                  <a:srgbClr val="FFFFFF"/>
+                </a:solidFill>
+              </a14:hiddenFill>
+            </a:ext>
+            <a:ext uri="{91240B29-F687-4F45-9708-019B960494DF}">
+              <a14:hiddenLine xmlns:a14="http://schemas.microsoft.com/office/drawing/2010/main" w="9525">
+                <a:solidFill>
+                  <a:srgbClr val="000000"/>
+                </a:solidFill>
+                <a:miter lim="800000"/>
+                <a:headEnd/>
+                <a:tailEnd/>
+              </a14:hiddenLine>
+            </a:ext>
+          </a:extLst>
+        </p:spPr>
+      </p:pic>
     </p:spTree>
     <p:extLst>
       <p:ext uri="{BB962C8B-B14F-4D97-AF65-F5344CB8AC3E}">

</xml_diff>